<commit_message>
Final verification of documentations
</commit_message>
<xml_diff>
--- a/Documents/ows/GSKY_Crawl_MAS.pptx
+++ b/Documents/ows/GSKY_Crawl_MAS.pptx
@@ -13,6 +13,7 @@
     <p:sldId id="267" r:id="rId7"/>
     <p:sldId id="264" r:id="rId8"/>
     <p:sldId id="268" r:id="rId9"/>
+    <p:sldId id="270" r:id="rId10"/>
   </p:sldIdLst>
   <p:sldSz cx="12192000" cy="6858000"/>
   <p:notesSz cx="6858000" cy="9144000"/>
@@ -467,7 +468,7 @@
           <a:p>
             <a:fld id="{221F956C-5F97-4262-95A4-17918E5C673A}" type="datetimeFigureOut">
               <a:rPr lang="en-AU" smtClean="0"/>
-              <a:t>27/11/2018</a:t>
+              <a:t>16/03/2020</a:t>
             </a:fld>
             <a:endParaRPr lang="en-AU"/>
           </a:p>
@@ -805,7 +806,7 @@
           <a:p>
             <a:fld id="{221F956C-5F97-4262-95A4-17918E5C673A}" type="datetimeFigureOut">
               <a:rPr lang="en-AU" smtClean="0"/>
-              <a:t>27/11/2018</a:t>
+              <a:t>16/03/2020</a:t>
             </a:fld>
             <a:endParaRPr lang="en-AU"/>
           </a:p>
@@ -1206,7 +1207,7 @@
           <a:p>
             <a:fld id="{221F956C-5F97-4262-95A4-17918E5C673A}" type="datetimeFigureOut">
               <a:rPr lang="en-AU" smtClean="0"/>
-              <a:t>27/11/2018</a:t>
+              <a:t>16/03/2020</a:t>
             </a:fld>
             <a:endParaRPr lang="en-AU"/>
           </a:p>
@@ -1542,7 +1543,7 @@
           <a:p>
             <a:fld id="{221F956C-5F97-4262-95A4-17918E5C673A}" type="datetimeFigureOut">
               <a:rPr lang="en-AU" smtClean="0"/>
-              <a:t>27/11/2018</a:t>
+              <a:t>16/03/2020</a:t>
             </a:fld>
             <a:endParaRPr lang="en-AU"/>
           </a:p>
@@ -1862,7 +1863,7 @@
           <a:p>
             <a:fld id="{221F956C-5F97-4262-95A4-17918E5C673A}" type="datetimeFigureOut">
               <a:rPr lang="en-AU" smtClean="0"/>
-              <a:t>27/11/2018</a:t>
+              <a:t>16/03/2020</a:t>
             </a:fld>
             <a:endParaRPr lang="en-AU"/>
           </a:p>
@@ -2258,7 +2259,7 @@
           <a:p>
             <a:fld id="{221F956C-5F97-4262-95A4-17918E5C673A}" type="datetimeFigureOut">
               <a:rPr lang="en-AU" smtClean="0"/>
-              <a:t>27/11/2018</a:t>
+              <a:t>16/03/2020</a:t>
             </a:fld>
             <a:endParaRPr lang="en-AU"/>
           </a:p>
@@ -2515,7 +2516,7 @@
           <a:p>
             <a:fld id="{221F956C-5F97-4262-95A4-17918E5C673A}" type="datetimeFigureOut">
               <a:rPr lang="en-AU" smtClean="0"/>
-              <a:t>27/11/2018</a:t>
+              <a:t>16/03/2020</a:t>
             </a:fld>
             <a:endParaRPr lang="en-AU"/>
           </a:p>
@@ -2777,7 +2778,7 @@
           <a:p>
             <a:fld id="{221F956C-5F97-4262-95A4-17918E5C673A}" type="datetimeFigureOut">
               <a:rPr lang="en-AU" smtClean="0"/>
-              <a:t>27/11/2018</a:t>
+              <a:t>16/03/2020</a:t>
             </a:fld>
             <a:endParaRPr lang="en-AU"/>
           </a:p>
@@ -3108,7 +3109,7 @@
           <a:p>
             <a:fld id="{221F956C-5F97-4262-95A4-17918E5C673A}" type="datetimeFigureOut">
               <a:rPr lang="en-AU" smtClean="0"/>
-              <a:t>27/11/2018</a:t>
+              <a:t>16/03/2020</a:t>
             </a:fld>
             <a:endParaRPr lang="en-AU"/>
           </a:p>
@@ -3295,7 +3296,7 @@
           <a:p>
             <a:fld id="{221F956C-5F97-4262-95A4-17918E5C673A}" type="datetimeFigureOut">
               <a:rPr lang="en-AU" smtClean="0"/>
-              <a:t>27/11/2018</a:t>
+              <a:t>16/03/2020</a:t>
             </a:fld>
             <a:endParaRPr lang="en-AU"/>
           </a:p>
@@ -3654,7 +3655,7 @@
           <a:p>
             <a:fld id="{221F956C-5F97-4262-95A4-17918E5C673A}" type="datetimeFigureOut">
               <a:rPr lang="en-AU" smtClean="0"/>
-              <a:t>27/11/2018</a:t>
+              <a:t>16/03/2020</a:t>
             </a:fld>
             <a:endParaRPr lang="en-AU"/>
           </a:p>
@@ -3977,7 +3978,7 @@
           <a:p>
             <a:fld id="{221F956C-5F97-4262-95A4-17918E5C673A}" type="datetimeFigureOut">
               <a:rPr lang="en-AU" smtClean="0"/>
-              <a:t>27/11/2018</a:t>
+              <a:t>16/03/2020</a:t>
             </a:fld>
             <a:endParaRPr lang="en-AU"/>
           </a:p>
@@ -4434,7 +4435,7 @@
           <a:p>
             <a:fld id="{221F956C-5F97-4262-95A4-17918E5C673A}" type="datetimeFigureOut">
               <a:rPr lang="en-AU" smtClean="0"/>
-              <a:t>27/11/2018</a:t>
+              <a:t>16/03/2020</a:t>
             </a:fld>
             <a:endParaRPr lang="en-AU"/>
           </a:p>
@@ -4639,7 +4640,7 @@
           <a:p>
             <a:fld id="{221F956C-5F97-4262-95A4-17918E5C673A}" type="datetimeFigureOut">
               <a:rPr lang="en-AU" smtClean="0"/>
-              <a:t>27/11/2018</a:t>
+              <a:t>16/03/2020</a:t>
             </a:fld>
             <a:endParaRPr lang="en-AU"/>
           </a:p>
@@ -4816,7 +4817,7 @@
           <a:p>
             <a:fld id="{221F956C-5F97-4262-95A4-17918E5C673A}" type="datetimeFigureOut">
               <a:rPr lang="en-AU" smtClean="0"/>
-              <a:t>27/11/2018</a:t>
+              <a:t>16/03/2020</a:t>
             </a:fld>
             <a:endParaRPr lang="en-AU"/>
           </a:p>
@@ -5149,7 +5150,7 @@
           <a:p>
             <a:fld id="{221F956C-5F97-4262-95A4-17918E5C673A}" type="datetimeFigureOut">
               <a:rPr lang="en-AU" smtClean="0"/>
-              <a:t>27/11/2018</a:t>
+              <a:t>16/03/2020</a:t>
             </a:fld>
             <a:endParaRPr lang="en-AU"/>
           </a:p>
@@ -7894,7 +7895,7 @@
             <a:fld id="{B61BEF0D-F0BB-DE4B-95CE-6DB70DBA9567}" type="datetimeFigureOut">
               <a:rPr lang="en-US" dirty="0"/>
               <a:pPr/>
-              <a:t>11/27/2018</a:t>
+              <a:t>3/16/2020</a:t>
             </a:fld>
             <a:endParaRPr lang="en-US" dirty="0"/>
           </a:p>
@@ -37097,6 +37098,740 @@
 </p:sld>
 </file>
 
+<file path=ppt/slides/slide8.xml><?xml version="1.0" encoding="utf-8"?>
+<p:sld xmlns:a="http://schemas.openxmlformats.org/drawingml/2006/main" xmlns:r="http://schemas.openxmlformats.org/officeDocument/2006/relationships" xmlns:p="http://schemas.openxmlformats.org/presentationml/2006/main">
+  <p:cSld>
+    <p:spTree>
+      <p:nvGrpSpPr>
+        <p:cNvPr id="1" name=""/>
+        <p:cNvGrpSpPr/>
+        <p:nvPr/>
+      </p:nvGrpSpPr>
+      <p:grpSpPr>
+        <a:xfrm>
+          <a:off x="0" y="0"/>
+          <a:ext cx="0" cy="0"/>
+          <a:chOff x="0" y="0"/>
+          <a:chExt cx="0" cy="0"/>
+        </a:xfrm>
+      </p:grpSpPr>
+      <p:sp>
+        <p:nvSpPr>
+          <p:cNvPr id="2" name="Title 1">
+            <a:extLst>
+              <a:ext uri="{FF2B5EF4-FFF2-40B4-BE49-F238E27FC236}">
+                <a16:creationId xmlns:a16="http://schemas.microsoft.com/office/drawing/2014/main" id="{C735E4FE-D725-4E07-8CA7-AE105A11C096}"/>
+              </a:ext>
+            </a:extLst>
+          </p:cNvPr>
+          <p:cNvSpPr>
+            <a:spLocks noGrp="1"/>
+          </p:cNvSpPr>
+          <p:nvPr>
+            <p:ph type="title"/>
+          </p:nvPr>
+        </p:nvSpPr>
+        <p:spPr/>
+        <p:txBody>
+          <a:bodyPr/>
+          <a:lstStyle/>
+          <a:p>
+            <a:r>
+              <a:rPr lang="en-US" dirty="0"/>
+              <a:t>How to start the MAS server</a:t>
+            </a:r>
+            <a:endParaRPr lang="en-AU" dirty="0"/>
+          </a:p>
+        </p:txBody>
+      </p:sp>
+      <p:sp>
+        <p:nvSpPr>
+          <p:cNvPr id="4" name="Rectangle 1">
+            <a:extLst>
+              <a:ext uri="{FF2B5EF4-FFF2-40B4-BE49-F238E27FC236}">
+                <a16:creationId xmlns:a16="http://schemas.microsoft.com/office/drawing/2014/main" id="{17F24B4D-E937-4ECC-AC10-E7534264671D}"/>
+              </a:ext>
+            </a:extLst>
+          </p:cNvPr>
+          <p:cNvSpPr>
+            <a:spLocks noGrp="1" noChangeArrowheads="1"/>
+          </p:cNvSpPr>
+          <p:nvPr>
+            <p:ph idx="1"/>
+          </p:nvPr>
+        </p:nvSpPr>
+        <p:spPr bwMode="auto">
+          <a:xfrm>
+            <a:off x="2589212" y="3145248"/>
+            <a:ext cx="4607287" cy="1754326"/>
+          </a:xfrm>
+          <a:prstGeom prst="rect">
+            <a:avLst/>
+          </a:prstGeom>
+          <a:solidFill>
+            <a:srgbClr val="FFFFFF"/>
+          </a:solidFill>
+          <a:ln>
+            <a:noFill/>
+          </a:ln>
+          <a:effectLst/>
+          <a:extLst>
+            <a:ext uri="{91240B29-F687-4F45-9708-019B960494DF}">
+              <a14:hiddenLine xmlns:a14="http://schemas.microsoft.com/office/drawing/2010/main" w="9525">
+                <a:solidFill>
+                  <a:schemeClr val="tx1"/>
+                </a:solidFill>
+                <a:miter lim="800000"/>
+                <a:headEnd/>
+                <a:tailEnd/>
+              </a14:hiddenLine>
+            </a:ext>
+            <a:ext uri="{AF507438-7753-43E0-B8FC-AC1667EBCBE1}">
+              <a14:hiddenEffects xmlns:a14="http://schemas.microsoft.com/office/drawing/2010/main">
+                <a:effectLst>
+                  <a:outerShdw dist="35921" dir="2700000" algn="ctr" rotWithShape="0">
+                    <a:schemeClr val="bg2"/>
+                  </a:outerShdw>
+                </a:effectLst>
+              </a14:hiddenEffects>
+            </a:ext>
+          </a:extLst>
+        </p:spPr>
+        <p:txBody>
+          <a:bodyPr vert="horz" wrap="none" lIns="0" tIns="0" rIns="0" bIns="0" numCol="1" anchor="ctr" anchorCtr="0" compatLnSpc="1">
+            <a:prstTxWarp prst="textNoShape">
+              <a:avLst/>
+            </a:prstTxWarp>
+            <a:spAutoFit/>
+          </a:bodyPr>
+          <a:lstStyle/>
+          <a:p>
+            <a:pPr marL="0" marR="0" lvl="0" indent="0" algn="l" defTabSz="914400" rtl="0" eaLnBrk="0" fontAlgn="base" latinLnBrk="0" hangingPunct="0">
+              <a:lnSpc>
+                <a:spcPct val="100000"/>
+              </a:lnSpc>
+              <a:spcBef>
+                <a:spcPct val="0"/>
+              </a:spcBef>
+              <a:spcAft>
+                <a:spcPct val="0"/>
+              </a:spcAft>
+              <a:buClrTx/>
+              <a:buSzTx/>
+              <a:buFontTx/>
+              <a:buChar char="•"/>
+              <a:tabLst/>
+            </a:pPr>
+            <a:r>
+              <a:rPr kumimoji="0" lang="en-US" altLang="en-US" sz="1200" b="0" i="0" u="none" strike="noStrike" cap="none" normalizeH="0" baseline="0" dirty="0">
+                <a:ln>
+                  <a:noFill/>
+                </a:ln>
+                <a:solidFill>
+                  <a:srgbClr val="24292E"/>
+                </a:solidFill>
+                <a:effectLst/>
+                <a:latin typeface="-apple-system"/>
+              </a:rPr>
+              <a:t>Start the MAS Restful API server: </a:t>
+            </a:r>
+            <a:r>
+              <a:rPr kumimoji="0" lang="en-US" altLang="en-US" sz="900" b="0" i="0" u="none" strike="noStrike" cap="none" normalizeH="0" baseline="0" dirty="0">
+                <a:ln>
+                  <a:noFill/>
+                </a:ln>
+                <a:solidFill>
+                  <a:srgbClr val="24292E"/>
+                </a:solidFill>
+                <a:effectLst/>
+                <a:latin typeface="SFMono-Regular"/>
+              </a:rPr>
+              <a:t>/opt/gsky/</a:t>
+            </a:r>
+            <a:r>
+              <a:rPr kumimoji="0" lang="en-US" altLang="en-US" sz="900" b="0" i="0" u="none" strike="noStrike" cap="none" normalizeH="0" baseline="0" dirty="0" err="1">
+                <a:ln>
+                  <a:noFill/>
+                </a:ln>
+                <a:solidFill>
+                  <a:srgbClr val="24292E"/>
+                </a:solidFill>
+                <a:effectLst/>
+                <a:latin typeface="SFMono-Regular"/>
+              </a:rPr>
+              <a:t>sbin</a:t>
+            </a:r>
+            <a:r>
+              <a:rPr kumimoji="0" lang="en-US" altLang="en-US" sz="900" b="0" i="0" u="none" strike="noStrike" cap="none" normalizeH="0" baseline="0" dirty="0">
+                <a:ln>
+                  <a:noFill/>
+                </a:ln>
+                <a:solidFill>
+                  <a:srgbClr val="24292E"/>
+                </a:solidFill>
+                <a:effectLst/>
+                <a:latin typeface="SFMono-Regular"/>
+              </a:rPr>
+              <a:t>/</a:t>
+            </a:r>
+            <a:r>
+              <a:rPr kumimoji="0" lang="en-US" altLang="en-US" sz="900" b="0" i="0" u="none" strike="noStrike" cap="none" normalizeH="0" baseline="0" dirty="0" err="1">
+                <a:ln>
+                  <a:noFill/>
+                </a:ln>
+                <a:solidFill>
+                  <a:srgbClr val="24292E"/>
+                </a:solidFill>
+                <a:effectLst/>
+                <a:latin typeface="SFMono-Regular"/>
+              </a:rPr>
+              <a:t>masapi</a:t>
+            </a:r>
+            <a:r>
+              <a:rPr kumimoji="0" lang="en-US" altLang="en-US" sz="900" b="0" i="0" u="none" strike="noStrike" cap="none" normalizeH="0" baseline="0" dirty="0">
+                <a:ln>
+                  <a:noFill/>
+                </a:ln>
+                <a:solidFill>
+                  <a:srgbClr val="24292E"/>
+                </a:solidFill>
+                <a:effectLst/>
+                <a:latin typeface="SFMono-Regular"/>
+              </a:rPr>
+              <a:t> -port 8888</a:t>
+            </a:r>
+            <a:endParaRPr kumimoji="0" lang="en-US" altLang="en-US" sz="1200" b="0" i="0" u="none" strike="noStrike" cap="none" normalizeH="0" baseline="0" dirty="0">
+              <a:ln>
+                <a:noFill/>
+              </a:ln>
+              <a:solidFill>
+                <a:srgbClr val="24292E"/>
+              </a:solidFill>
+              <a:effectLst/>
+              <a:latin typeface="-apple-system"/>
+            </a:endParaRPr>
+          </a:p>
+          <a:p>
+            <a:pPr marL="0" marR="0" lvl="0" indent="0" algn="l" defTabSz="914400" rtl="0" eaLnBrk="0" fontAlgn="base" latinLnBrk="0" hangingPunct="0">
+              <a:lnSpc>
+                <a:spcPct val="100000"/>
+              </a:lnSpc>
+              <a:spcBef>
+                <a:spcPct val="0"/>
+              </a:spcBef>
+              <a:spcAft>
+                <a:spcPct val="0"/>
+              </a:spcAft>
+              <a:buClrTx/>
+              <a:buSzTx/>
+              <a:buFontTx/>
+              <a:buNone/>
+              <a:tabLst/>
+            </a:pPr>
+            <a:r>
+              <a:rPr kumimoji="0" lang="en-US" altLang="en-US" sz="1200" b="0" i="0" u="none" strike="noStrike" cap="none" normalizeH="0" baseline="0" dirty="0">
+                <a:ln>
+                  <a:noFill/>
+                </a:ln>
+                <a:solidFill>
+                  <a:srgbClr val="24292E"/>
+                </a:solidFill>
+                <a:effectLst/>
+                <a:latin typeface="-apple-system"/>
+              </a:rPr>
+              <a:t>The </a:t>
+            </a:r>
+            <a:r>
+              <a:rPr kumimoji="0" lang="en-US" altLang="en-US" sz="900" b="0" i="0" u="none" strike="noStrike" cap="none" normalizeH="0" baseline="0" dirty="0">
+                <a:ln>
+                  <a:noFill/>
+                </a:ln>
+                <a:solidFill>
+                  <a:srgbClr val="24292E"/>
+                </a:solidFill>
+                <a:effectLst/>
+                <a:latin typeface="SFMono-Regular"/>
+              </a:rPr>
+              <a:t>-port</a:t>
+            </a:r>
+            <a:r>
+              <a:rPr kumimoji="0" lang="en-US" altLang="en-US" sz="1200" b="0" i="0" u="none" strike="noStrike" cap="none" normalizeH="0" baseline="0" dirty="0">
+                <a:ln>
+                  <a:noFill/>
+                </a:ln>
+                <a:solidFill>
+                  <a:srgbClr val="24292E"/>
+                </a:solidFill>
+                <a:effectLst/>
+                <a:latin typeface="-apple-system"/>
+              </a:rPr>
+              <a:t> option sets the API server listening port. The default is port 8080.</a:t>
+            </a:r>
+          </a:p>
+          <a:p>
+            <a:pPr marL="0" marR="0" lvl="0" indent="0" algn="l" defTabSz="914400" rtl="0" eaLnBrk="0" fontAlgn="base" latinLnBrk="0" hangingPunct="0">
+              <a:lnSpc>
+                <a:spcPct val="100000"/>
+              </a:lnSpc>
+              <a:spcBef>
+                <a:spcPct val="0"/>
+              </a:spcBef>
+              <a:spcAft>
+                <a:spcPct val="0"/>
+              </a:spcAft>
+              <a:buClrTx/>
+              <a:buSzTx/>
+              <a:buFontTx/>
+              <a:buNone/>
+              <a:tabLst/>
+            </a:pPr>
+            <a:endParaRPr kumimoji="0" lang="en-US" altLang="en-US" sz="1200" b="0" i="0" u="none" strike="noStrike" cap="none" normalizeH="0" baseline="0" dirty="0">
+              <a:ln>
+                <a:noFill/>
+              </a:ln>
+              <a:solidFill>
+                <a:srgbClr val="24292E"/>
+              </a:solidFill>
+              <a:effectLst/>
+              <a:latin typeface="-apple-system"/>
+            </a:endParaRPr>
+          </a:p>
+          <a:p>
+            <a:pPr marL="0" marR="0" lvl="0" indent="0" algn="l" defTabSz="914400" rtl="0" eaLnBrk="0" fontAlgn="base" latinLnBrk="0" hangingPunct="0">
+              <a:lnSpc>
+                <a:spcPct val="100000"/>
+              </a:lnSpc>
+              <a:spcBef>
+                <a:spcPct val="0"/>
+              </a:spcBef>
+              <a:spcAft>
+                <a:spcPct val="0"/>
+              </a:spcAft>
+              <a:buClrTx/>
+              <a:buSzTx/>
+              <a:buFontTx/>
+              <a:buChar char="•"/>
+              <a:tabLst/>
+            </a:pPr>
+            <a:r>
+              <a:rPr kumimoji="0" lang="en-US" altLang="en-US" sz="1200" b="0" i="0" u="none" strike="noStrike" cap="none" normalizeH="0" baseline="0" dirty="0">
+                <a:ln>
+                  <a:noFill/>
+                </a:ln>
+                <a:solidFill>
+                  <a:srgbClr val="24292E"/>
+                </a:solidFill>
+                <a:effectLst/>
+                <a:latin typeface="-apple-system"/>
+              </a:rPr>
+              <a:t>Start all the RPC worker nodes: </a:t>
+            </a:r>
+            <a:r>
+              <a:rPr kumimoji="0" lang="en-US" altLang="en-US" sz="900" b="0" i="0" u="none" strike="noStrike" cap="none" normalizeH="0" baseline="0" dirty="0">
+                <a:ln>
+                  <a:noFill/>
+                </a:ln>
+                <a:solidFill>
+                  <a:srgbClr val="24292E"/>
+                </a:solidFill>
+                <a:effectLst/>
+                <a:latin typeface="SFMono-Regular"/>
+              </a:rPr>
+              <a:t>/opt/gsky/</a:t>
+            </a:r>
+            <a:r>
+              <a:rPr kumimoji="0" lang="en-US" altLang="en-US" sz="900" b="0" i="0" u="none" strike="noStrike" cap="none" normalizeH="0" baseline="0" dirty="0" err="1">
+                <a:ln>
+                  <a:noFill/>
+                </a:ln>
+                <a:solidFill>
+                  <a:srgbClr val="24292E"/>
+                </a:solidFill>
+                <a:effectLst/>
+                <a:latin typeface="SFMono-Regular"/>
+              </a:rPr>
+              <a:t>sbin</a:t>
+            </a:r>
+            <a:r>
+              <a:rPr kumimoji="0" lang="en-US" altLang="en-US" sz="900" b="0" i="0" u="none" strike="noStrike" cap="none" normalizeH="0" baseline="0" dirty="0">
+                <a:ln>
+                  <a:noFill/>
+                </a:ln>
+                <a:solidFill>
+                  <a:srgbClr val="24292E"/>
+                </a:solidFill>
+                <a:effectLst/>
+                <a:latin typeface="SFMono-Regular"/>
+              </a:rPr>
+              <a:t>/gsky-</a:t>
+            </a:r>
+            <a:r>
+              <a:rPr kumimoji="0" lang="en-US" altLang="en-US" sz="900" b="0" i="0" u="none" strike="noStrike" cap="none" normalizeH="0" baseline="0" dirty="0" err="1">
+                <a:ln>
+                  <a:noFill/>
+                </a:ln>
+                <a:solidFill>
+                  <a:srgbClr val="24292E"/>
+                </a:solidFill>
+                <a:effectLst/>
+                <a:latin typeface="SFMono-Regular"/>
+              </a:rPr>
+              <a:t>rpc</a:t>
+            </a:r>
+            <a:r>
+              <a:rPr kumimoji="0" lang="en-US" altLang="en-US" sz="900" b="0" i="0" u="none" strike="noStrike" cap="none" normalizeH="0" baseline="0" dirty="0">
+                <a:ln>
+                  <a:noFill/>
+                </a:ln>
+                <a:solidFill>
+                  <a:srgbClr val="24292E"/>
+                </a:solidFill>
+                <a:effectLst/>
+                <a:latin typeface="SFMono-Regular"/>
+              </a:rPr>
+              <a:t> -p 6000</a:t>
+            </a:r>
+            <a:endParaRPr kumimoji="0" lang="en-US" altLang="en-US" sz="1200" b="0" i="0" u="none" strike="noStrike" cap="none" normalizeH="0" baseline="0" dirty="0">
+              <a:ln>
+                <a:noFill/>
+              </a:ln>
+              <a:solidFill>
+                <a:srgbClr val="24292E"/>
+              </a:solidFill>
+              <a:effectLst/>
+              <a:latin typeface="-apple-system"/>
+            </a:endParaRPr>
+          </a:p>
+          <a:p>
+            <a:pPr marL="0" marR="0" lvl="0" indent="0" algn="l" defTabSz="914400" rtl="0" eaLnBrk="0" fontAlgn="base" latinLnBrk="0" hangingPunct="0">
+              <a:lnSpc>
+                <a:spcPct val="100000"/>
+              </a:lnSpc>
+              <a:spcBef>
+                <a:spcPct val="0"/>
+              </a:spcBef>
+              <a:spcAft>
+                <a:spcPct val="0"/>
+              </a:spcAft>
+              <a:buClrTx/>
+              <a:buSzTx/>
+              <a:buFontTx/>
+              <a:buNone/>
+              <a:tabLst/>
+            </a:pPr>
+            <a:r>
+              <a:rPr kumimoji="0" lang="en-US" altLang="en-US" sz="1200" b="0" i="0" u="none" strike="noStrike" cap="none" normalizeH="0" baseline="0" dirty="0">
+                <a:ln>
+                  <a:noFill/>
+                </a:ln>
+                <a:solidFill>
+                  <a:srgbClr val="24292E"/>
+                </a:solidFill>
+                <a:effectLst/>
+                <a:latin typeface="-apple-system"/>
+              </a:rPr>
+              <a:t>The </a:t>
+            </a:r>
+            <a:r>
+              <a:rPr kumimoji="0" lang="en-US" altLang="en-US" sz="900" b="0" i="0" u="none" strike="noStrike" cap="none" normalizeH="0" baseline="0" dirty="0">
+                <a:ln>
+                  <a:noFill/>
+                </a:ln>
+                <a:solidFill>
+                  <a:srgbClr val="24292E"/>
+                </a:solidFill>
+                <a:effectLst/>
+                <a:latin typeface="SFMono-Regular"/>
+              </a:rPr>
+              <a:t>-p</a:t>
+            </a:r>
+            <a:r>
+              <a:rPr kumimoji="0" lang="en-US" altLang="en-US" sz="1200" b="0" i="0" u="none" strike="noStrike" cap="none" normalizeH="0" baseline="0" dirty="0">
+                <a:ln>
+                  <a:noFill/>
+                </a:ln>
+                <a:solidFill>
+                  <a:srgbClr val="24292E"/>
+                </a:solidFill>
+                <a:effectLst/>
+                <a:latin typeface="-apple-system"/>
+              </a:rPr>
+              <a:t> option sets the </a:t>
+            </a:r>
+            <a:r>
+              <a:rPr kumimoji="0" lang="en-US" altLang="en-US" sz="1200" b="0" i="0" u="none" strike="noStrike" cap="none" normalizeH="0" baseline="0" dirty="0" err="1">
+                <a:ln>
+                  <a:noFill/>
+                </a:ln>
+                <a:solidFill>
+                  <a:srgbClr val="24292E"/>
+                </a:solidFill>
+                <a:effectLst/>
+                <a:latin typeface="-apple-system"/>
+              </a:rPr>
+              <a:t>gRPC</a:t>
+            </a:r>
+            <a:r>
+              <a:rPr kumimoji="0" lang="en-US" altLang="en-US" sz="1200" b="0" i="0" u="none" strike="noStrike" cap="none" normalizeH="0" baseline="0" dirty="0">
+                <a:ln>
+                  <a:noFill/>
+                </a:ln>
+                <a:solidFill>
+                  <a:srgbClr val="24292E"/>
+                </a:solidFill>
+                <a:effectLst/>
+                <a:latin typeface="-apple-system"/>
+              </a:rPr>
+              <a:t> listening port. The default is port </a:t>
+            </a:r>
+            <a:r>
+              <a:rPr kumimoji="0" lang="en-US" altLang="en-US" sz="1200" b="0" i="0" u="none" strike="noStrike" cap="none" normalizeH="0" baseline="0">
+                <a:ln>
+                  <a:noFill/>
+                </a:ln>
+                <a:solidFill>
+                  <a:srgbClr val="24292E"/>
+                </a:solidFill>
+                <a:effectLst/>
+                <a:latin typeface="-apple-system"/>
+              </a:rPr>
+              <a:t>6000.</a:t>
+            </a:r>
+          </a:p>
+          <a:p>
+            <a:pPr marL="0" marR="0" lvl="0" indent="0" algn="l" defTabSz="914400" rtl="0" eaLnBrk="0" fontAlgn="base" latinLnBrk="0" hangingPunct="0">
+              <a:lnSpc>
+                <a:spcPct val="100000"/>
+              </a:lnSpc>
+              <a:spcBef>
+                <a:spcPct val="0"/>
+              </a:spcBef>
+              <a:spcAft>
+                <a:spcPct val="0"/>
+              </a:spcAft>
+              <a:buClrTx/>
+              <a:buSzTx/>
+              <a:buFontTx/>
+              <a:buNone/>
+              <a:tabLst/>
+            </a:pPr>
+            <a:endParaRPr kumimoji="0" lang="en-US" altLang="en-US" sz="1200" b="0" i="0" u="none" strike="noStrike" cap="none" normalizeH="0" baseline="0" dirty="0">
+              <a:ln>
+                <a:noFill/>
+              </a:ln>
+              <a:solidFill>
+                <a:srgbClr val="24292E"/>
+              </a:solidFill>
+              <a:effectLst/>
+              <a:latin typeface="-apple-system"/>
+            </a:endParaRPr>
+          </a:p>
+          <a:p>
+            <a:pPr marL="0" marR="0" lvl="0" indent="0" algn="l" defTabSz="914400" rtl="0" eaLnBrk="0" fontAlgn="base" latinLnBrk="0" hangingPunct="0">
+              <a:lnSpc>
+                <a:spcPct val="100000"/>
+              </a:lnSpc>
+              <a:spcBef>
+                <a:spcPct val="0"/>
+              </a:spcBef>
+              <a:spcAft>
+                <a:spcPct val="0"/>
+              </a:spcAft>
+              <a:buClrTx/>
+              <a:buSzTx/>
+              <a:buFontTx/>
+              <a:buChar char="•"/>
+              <a:tabLst/>
+            </a:pPr>
+            <a:r>
+              <a:rPr kumimoji="0" lang="en-US" altLang="en-US" sz="1200" b="0" i="0" u="none" strike="noStrike" cap="none" normalizeH="0" baseline="0" dirty="0">
+                <a:ln>
+                  <a:noFill/>
+                </a:ln>
+                <a:solidFill>
+                  <a:srgbClr val="24292E"/>
+                </a:solidFill>
+                <a:effectLst/>
+                <a:latin typeface="-apple-system"/>
+              </a:rPr>
+              <a:t>Start the main server: </a:t>
+            </a:r>
+            <a:r>
+              <a:rPr kumimoji="0" lang="en-US" altLang="en-US" sz="900" b="0" i="0" u="none" strike="noStrike" cap="none" normalizeH="0" baseline="0" dirty="0">
+                <a:ln>
+                  <a:noFill/>
+                </a:ln>
+                <a:solidFill>
+                  <a:srgbClr val="24292E"/>
+                </a:solidFill>
+                <a:effectLst/>
+                <a:latin typeface="SFMono-Regular"/>
+              </a:rPr>
+              <a:t>/opt/gsky/</a:t>
+            </a:r>
+            <a:r>
+              <a:rPr kumimoji="0" lang="en-US" altLang="en-US" sz="900" b="0" i="0" u="none" strike="noStrike" cap="none" normalizeH="0" baseline="0" dirty="0" err="1">
+                <a:ln>
+                  <a:noFill/>
+                </a:ln>
+                <a:solidFill>
+                  <a:srgbClr val="24292E"/>
+                </a:solidFill>
+                <a:effectLst/>
+                <a:latin typeface="SFMono-Regular"/>
+              </a:rPr>
+              <a:t>sbin</a:t>
+            </a:r>
+            <a:r>
+              <a:rPr kumimoji="0" lang="en-US" altLang="en-US" sz="900" b="0" i="0" u="none" strike="noStrike" cap="none" normalizeH="0" baseline="0" dirty="0">
+                <a:ln>
+                  <a:noFill/>
+                </a:ln>
+                <a:solidFill>
+                  <a:srgbClr val="24292E"/>
+                </a:solidFill>
+                <a:effectLst/>
+                <a:latin typeface="SFMono-Regular"/>
+              </a:rPr>
+              <a:t>/gsky-</a:t>
+            </a:r>
+            <a:r>
+              <a:rPr kumimoji="0" lang="en-US" altLang="en-US" sz="900" b="0" i="0" u="none" strike="noStrike" cap="none" normalizeH="0" baseline="0" dirty="0" err="1">
+                <a:ln>
+                  <a:noFill/>
+                </a:ln>
+                <a:solidFill>
+                  <a:srgbClr val="24292E"/>
+                </a:solidFill>
+                <a:effectLst/>
+                <a:latin typeface="SFMono-Regular"/>
+              </a:rPr>
+              <a:t>ows</a:t>
+            </a:r>
+            <a:r>
+              <a:rPr kumimoji="0" lang="en-US" altLang="en-US" sz="900" b="0" i="0" u="none" strike="noStrike" cap="none" normalizeH="0" baseline="0" dirty="0">
+                <a:ln>
+                  <a:noFill/>
+                </a:ln>
+                <a:solidFill>
+                  <a:srgbClr val="24292E"/>
+                </a:solidFill>
+                <a:effectLst/>
+                <a:latin typeface="SFMono-Regular"/>
+              </a:rPr>
+              <a:t> -p 8080</a:t>
+            </a:r>
+            <a:endParaRPr kumimoji="0" lang="en-US" altLang="en-US" sz="1200" b="0" i="0" u="none" strike="noStrike" cap="none" normalizeH="0" baseline="0" dirty="0">
+              <a:ln>
+                <a:noFill/>
+              </a:ln>
+              <a:solidFill>
+                <a:srgbClr val="24292E"/>
+              </a:solidFill>
+              <a:effectLst/>
+              <a:latin typeface="-apple-system"/>
+            </a:endParaRPr>
+          </a:p>
+          <a:p>
+            <a:pPr marL="0" marR="0" lvl="0" indent="0" algn="l" defTabSz="914400" rtl="0" eaLnBrk="0" fontAlgn="base" latinLnBrk="0" hangingPunct="0">
+              <a:lnSpc>
+                <a:spcPct val="100000"/>
+              </a:lnSpc>
+              <a:spcBef>
+                <a:spcPct val="0"/>
+              </a:spcBef>
+              <a:spcAft>
+                <a:spcPct val="0"/>
+              </a:spcAft>
+              <a:buClrTx/>
+              <a:buSzTx/>
+              <a:buFontTx/>
+              <a:buNone/>
+              <a:tabLst/>
+            </a:pPr>
+            <a:r>
+              <a:rPr kumimoji="0" lang="en-US" altLang="en-US" sz="1200" b="0" i="0" u="none" strike="noStrike" cap="none" normalizeH="0" baseline="0" dirty="0">
+                <a:ln>
+                  <a:noFill/>
+                </a:ln>
+                <a:solidFill>
+                  <a:srgbClr val="24292E"/>
+                </a:solidFill>
+                <a:effectLst/>
+                <a:latin typeface="-apple-system"/>
+              </a:rPr>
+              <a:t>The </a:t>
+            </a:r>
+            <a:r>
+              <a:rPr kumimoji="0" lang="en-US" altLang="en-US" sz="900" b="0" i="0" u="none" strike="noStrike" cap="none" normalizeH="0" baseline="0" dirty="0">
+                <a:ln>
+                  <a:noFill/>
+                </a:ln>
+                <a:solidFill>
+                  <a:srgbClr val="24292E"/>
+                </a:solidFill>
+                <a:effectLst/>
+                <a:latin typeface="SFMono-Regular"/>
+              </a:rPr>
+              <a:t>-p</a:t>
+            </a:r>
+            <a:r>
+              <a:rPr kumimoji="0" lang="en-US" altLang="en-US" sz="1200" b="0" i="0" u="none" strike="noStrike" cap="none" normalizeH="0" baseline="0" dirty="0">
+                <a:ln>
+                  <a:noFill/>
+                </a:ln>
+                <a:solidFill>
+                  <a:srgbClr val="24292E"/>
+                </a:solidFill>
+                <a:effectLst/>
+                <a:latin typeface="-apple-system"/>
+              </a:rPr>
+              <a:t> option sets the main server listening port. The default is port 8080.</a:t>
+            </a:r>
+          </a:p>
+          <a:p>
+            <a:pPr marL="0" marR="0" lvl="0" indent="0" algn="l" defTabSz="914400" rtl="0" eaLnBrk="0" fontAlgn="base" latinLnBrk="0" hangingPunct="0">
+              <a:lnSpc>
+                <a:spcPct val="100000"/>
+              </a:lnSpc>
+              <a:spcBef>
+                <a:spcPct val="0"/>
+              </a:spcBef>
+              <a:spcAft>
+                <a:spcPct val="0"/>
+              </a:spcAft>
+              <a:buClrTx/>
+              <a:buSzTx/>
+              <a:buFontTx/>
+              <a:buNone/>
+              <a:tabLst/>
+            </a:pPr>
+            <a:endParaRPr kumimoji="0" lang="en-US" altLang="en-US" sz="1800" b="0" i="0" u="none" strike="noStrike" cap="none" normalizeH="0" baseline="0" dirty="0">
+              <a:ln>
+                <a:noFill/>
+              </a:ln>
+              <a:solidFill>
+                <a:schemeClr val="tx1"/>
+              </a:solidFill>
+              <a:effectLst/>
+              <a:latin typeface="Arial" panose="020B0604020202020204" pitchFamily="34" charset="0"/>
+            </a:endParaRPr>
+          </a:p>
+        </p:txBody>
+      </p:sp>
+    </p:spTree>
+    <p:extLst>
+      <p:ext uri="{BB962C8B-B14F-4D97-AF65-F5344CB8AC3E}">
+        <p14:creationId xmlns:p14="http://schemas.microsoft.com/office/powerpoint/2010/main" val="4176720959"/>
+      </p:ext>
+    </p:extLst>
+  </p:cSld>
+  <p:clrMapOvr>
+    <a:masterClrMapping/>
+  </p:clrMapOvr>
+</p:sld>
+</file>
+
 <file path=ppt/tags/tag1.xml><?xml version="1.0" encoding="utf-8"?>
 <p:tagLst xmlns:a="http://schemas.openxmlformats.org/drawingml/2006/main" xmlns:r="http://schemas.openxmlformats.org/officeDocument/2006/relationships" xmlns:p="http://schemas.openxmlformats.org/presentationml/2006/main">
   <p:tag name="TIMING" val="|0.8"/>

</xml_diff>